<commit_message>
added deployment issues slide; removed known issue dealing with HELP and ABOUT; added some known issues
</commit_message>
<xml_diff>
--- a/Final Presentation.pptx
+++ b/Final Presentation.pptx
@@ -18,11 +18,12 @@
     <p:sldId id="270" r:id="rId12"/>
     <p:sldId id="273" r:id="rId13"/>
     <p:sldId id="271" r:id="rId14"/>
-    <p:sldId id="265" r:id="rId15"/>
-    <p:sldId id="266" r:id="rId16"/>
-    <p:sldId id="267" r:id="rId17"/>
-    <p:sldId id="268" r:id="rId18"/>
-    <p:sldId id="269" r:id="rId19"/>
+    <p:sldId id="276" r:id="rId15"/>
+    <p:sldId id="265" r:id="rId16"/>
+    <p:sldId id="266" r:id="rId17"/>
+    <p:sldId id="267" r:id="rId18"/>
+    <p:sldId id="268" r:id="rId19"/>
+    <p:sldId id="269" r:id="rId20"/>
   </p:sldIdLst>
   <p:sldSz cx="12192000" cy="6858000"/>
   <p:notesSz cx="6858000" cy="9144000"/>
@@ -875,7 +876,7 @@
             <a:fld id="{B61BEF0D-F0BB-DE4B-95CE-6DB70DBA9567}" type="datetimeFigureOut">
               <a:rPr lang="en-US" smtClean="0"/>
               <a:pPr/>
-              <a:t>5/1/2017</a:t>
+              <a:t>5/2/2017</a:t>
             </a:fld>
             <a:endParaRPr lang="en-US" dirty="0"/>
           </a:p>
@@ -1128,7 +1129,7 @@
             <a:fld id="{B61BEF0D-F0BB-DE4B-95CE-6DB70DBA9567}" type="datetimeFigureOut">
               <a:rPr lang="en-US" smtClean="0"/>
               <a:pPr/>
-              <a:t>5/1/2017</a:t>
+              <a:t>5/2/2017</a:t>
             </a:fld>
             <a:endParaRPr lang="en-US" dirty="0"/>
           </a:p>
@@ -1444,7 +1445,7 @@
             <a:fld id="{B61BEF0D-F0BB-DE4B-95CE-6DB70DBA9567}" type="datetimeFigureOut">
               <a:rPr lang="en-US" smtClean="0"/>
               <a:pPr/>
-              <a:t>5/1/2017</a:t>
+              <a:t>5/2/2017</a:t>
             </a:fld>
             <a:endParaRPr lang="en-US" dirty="0"/>
           </a:p>
@@ -1779,7 +1780,7 @@
             <a:fld id="{B61BEF0D-F0BB-DE4B-95CE-6DB70DBA9567}" type="datetimeFigureOut">
               <a:rPr lang="en-US" smtClean="0"/>
               <a:pPr/>
-              <a:t>5/1/2017</a:t>
+              <a:t>5/2/2017</a:t>
             </a:fld>
             <a:endParaRPr lang="en-US" dirty="0"/>
           </a:p>
@@ -2095,7 +2096,7 @@
             <a:fld id="{B61BEF0D-F0BB-DE4B-95CE-6DB70DBA9567}" type="datetimeFigureOut">
               <a:rPr lang="en-US" smtClean="0"/>
               <a:pPr/>
-              <a:t>5/1/2017</a:t>
+              <a:t>5/2/2017</a:t>
             </a:fld>
             <a:endParaRPr lang="en-US" dirty="0"/>
           </a:p>
@@ -2490,7 +2491,7 @@
             <a:fld id="{B61BEF0D-F0BB-DE4B-95CE-6DB70DBA9567}" type="datetimeFigureOut">
               <a:rPr lang="en-US" smtClean="0"/>
               <a:pPr/>
-              <a:t>5/1/2017</a:t>
+              <a:t>5/2/2017</a:t>
             </a:fld>
             <a:endParaRPr lang="en-US" dirty="0"/>
           </a:p>
@@ -2661,7 +2662,7 @@
           <a:p>
             <a:fld id="{55C6B4A9-1611-4792-9094-5F34BCA07E0B}" type="datetimeFigureOut">
               <a:rPr lang="en-US" smtClean="0"/>
-              <a:t>5/1/2017</a:t>
+              <a:t>5/2/2017</a:t>
             </a:fld>
             <a:endParaRPr lang="en-US" dirty="0"/>
           </a:p>
@@ -2842,7 +2843,7 @@
             <a:fld id="{B61BEF0D-F0BB-DE4B-95CE-6DB70DBA9567}" type="datetimeFigureOut">
               <a:rPr lang="en-US" smtClean="0"/>
               <a:pPr/>
-              <a:t>5/1/2017</a:t>
+              <a:t>5/2/2017</a:t>
             </a:fld>
             <a:endParaRPr lang="en-US" dirty="0"/>
           </a:p>
@@ -3014,7 +3015,7 @@
             <a:fld id="{B61BEF0D-F0BB-DE4B-95CE-6DB70DBA9567}" type="datetimeFigureOut">
               <a:rPr lang="en-US" smtClean="0"/>
               <a:pPr/>
-              <a:t>5/1/2017</a:t>
+              <a:t>5/2/2017</a:t>
             </a:fld>
             <a:endParaRPr lang="en-US" dirty="0"/>
           </a:p>
@@ -3263,7 +3264,7 @@
             <a:fld id="{B61BEF0D-F0BB-DE4B-95CE-6DB70DBA9567}" type="datetimeFigureOut">
               <a:rPr lang="en-US" smtClean="0"/>
               <a:pPr/>
-              <a:t>5/1/2017</a:t>
+              <a:t>5/2/2017</a:t>
             </a:fld>
             <a:endParaRPr lang="en-US" dirty="0"/>
           </a:p>
@@ -3496,7 +3497,7 @@
           <a:p>
             <a:fld id="{EB712588-04B1-427B-82EE-E8DB90309F08}" type="datetimeFigureOut">
               <a:rPr lang="en-US" smtClean="0"/>
-              <a:t>5/1/2017</a:t>
+              <a:t>5/2/2017</a:t>
             </a:fld>
             <a:endParaRPr lang="en-US" dirty="0"/>
           </a:p>
@@ -3871,7 +3872,7 @@
             <a:fld id="{B61BEF0D-F0BB-DE4B-95CE-6DB70DBA9567}" type="datetimeFigureOut">
               <a:rPr lang="en-US" smtClean="0"/>
               <a:pPr/>
-              <a:t>5/1/2017</a:t>
+              <a:t>5/2/2017</a:t>
             </a:fld>
             <a:endParaRPr lang="en-US" dirty="0"/>
           </a:p>
@@ -3996,7 +3997,7 @@
             <a:fld id="{B61BEF0D-F0BB-DE4B-95CE-6DB70DBA9567}" type="datetimeFigureOut">
               <a:rPr lang="en-US" smtClean="0"/>
               <a:pPr/>
-              <a:t>5/1/2017</a:t>
+              <a:t>5/2/2017</a:t>
             </a:fld>
             <a:endParaRPr lang="en-US" dirty="0"/>
           </a:p>
@@ -4093,7 +4094,7 @@
             <a:fld id="{B61BEF0D-F0BB-DE4B-95CE-6DB70DBA9567}" type="datetimeFigureOut">
               <a:rPr lang="en-US" smtClean="0"/>
               <a:pPr/>
-              <a:t>5/1/2017</a:t>
+              <a:t>5/2/2017</a:t>
             </a:fld>
             <a:endParaRPr lang="en-US" dirty="0"/>
           </a:p>
@@ -4349,7 +4350,7 @@
           <a:p>
             <a:fld id="{42A54C80-263E-416B-A8E0-580EDEADCBDC}" type="datetimeFigureOut">
               <a:rPr lang="en-US" smtClean="0"/>
-              <a:t>5/1/2017</a:t>
+              <a:t>5/2/2017</a:t>
             </a:fld>
             <a:endParaRPr lang="en-US" dirty="0"/>
           </a:p>
@@ -4656,7 +4657,7 @@
             <a:fld id="{B61BEF0D-F0BB-DE4B-95CE-6DB70DBA9567}" type="datetimeFigureOut">
               <a:rPr lang="en-US" smtClean="0"/>
               <a:pPr/>
-              <a:t>5/1/2017</a:t>
+              <a:t>5/2/2017</a:t>
             </a:fld>
             <a:endParaRPr lang="en-US" dirty="0"/>
           </a:p>
@@ -5359,7 +5360,7 @@
             <a:fld id="{B61BEF0D-F0BB-DE4B-95CE-6DB70DBA9567}" type="datetimeFigureOut">
               <a:rPr lang="en-US" smtClean="0"/>
               <a:pPr/>
-              <a:t>5/1/2017</a:t>
+              <a:t>5/2/2017</a:t>
             </a:fld>
             <a:endParaRPr lang="en-US" dirty="0"/>
           </a:p>
@@ -6365,38 +6366,41 @@
             <a:pPr lvl="1"/>
             <a:r>
               <a:rPr lang="en-US" sz="2600" dirty="0" smtClean="0"/>
-              <a:t>Duplication of Menu options / 2</a:t>
-            </a:r>
-            <a:r>
-              <a:rPr lang="en-US" sz="2600" baseline="30000" dirty="0" smtClean="0"/>
-              <a:t>nd</a:t>
+              <a:t>Level </a:t>
             </a:r>
             <a:r>
               <a:rPr lang="en-US" sz="2600" dirty="0" smtClean="0"/>
-              <a:t> Help menu option un-functional as well as the about menu option</a:t>
+              <a:t>2 and 3 Boundary testing does the same thing</a:t>
             </a:r>
           </a:p>
           <a:p>
             <a:pPr lvl="1"/>
             <a:r>
               <a:rPr lang="en-US" sz="2600" dirty="0" smtClean="0"/>
-              <a:t>Level 2 and 3 Boundary testing does the same </a:t>
+              <a:t>Issue where if check boxes are switched too quickly the generate button won’t be enabled or disabled </a:t>
             </a:r>
             <a:r>
               <a:rPr lang="en-US" sz="2600" dirty="0" smtClean="0"/>
-              <a:t>thing</a:t>
+              <a:t>correctly</a:t>
             </a:r>
           </a:p>
           <a:p>
             <a:pPr lvl="1"/>
             <a:r>
               <a:rPr lang="en-US" sz="2600" dirty="0" smtClean="0"/>
-              <a:t>Issue where if check boxes are switched too quickly the generate button won’t be enabled or </a:t>
-            </a:r>
-            <a:r>
-              <a:rPr lang="en-US" sz="2600" smtClean="0"/>
-              <a:t>disabled correctly</a:t>
-            </a:r>
+              <a:t>Menu items to run tests aren’t disabled along with their corresponding button</a:t>
+            </a:r>
+          </a:p>
+          <a:p>
+            <a:pPr lvl="1"/>
+            <a:r>
+              <a:rPr lang="en-US" sz="2600" dirty="0" smtClean="0"/>
+              <a:t>File types are not restricted to their appropriate tests (.h files should only be able to do O-O testing)</a:t>
+            </a:r>
+            <a:endParaRPr lang="en-US" sz="2600" dirty="0" smtClean="0"/>
+          </a:p>
+          <a:p>
+            <a:pPr lvl="1"/>
             <a:endParaRPr lang="en-US" sz="2600" dirty="0" smtClean="0"/>
           </a:p>
         </p:txBody>
@@ -6508,7 +6512,15 @@
             <a:pPr lvl="1"/>
             <a:r>
               <a:rPr lang="en-US" sz="2600" dirty="0"/>
-              <a:t>If the .h file has any private methods of functions outside of the class, the driver will not generate </a:t>
+              <a:t>If the .h file has any private methods </a:t>
+            </a:r>
+            <a:r>
+              <a:rPr lang="en-US" sz="2600" dirty="0" smtClean="0"/>
+              <a:t>or </a:t>
+            </a:r>
+            <a:r>
+              <a:rPr lang="en-US" sz="2600" dirty="0"/>
+              <a:t>functions outside of the class, the driver will not generate </a:t>
             </a:r>
             <a:r>
               <a:rPr lang="en-US" sz="2600" dirty="0" smtClean="0"/>
@@ -6716,24 +6728,16 @@
             <p:ph type="title"/>
           </p:nvPr>
         </p:nvSpPr>
-        <p:spPr>
-          <a:xfrm>
-            <a:off x="677334" y="609600"/>
-            <a:ext cx="8596668" cy="711200"/>
-          </a:xfrm>
-        </p:spPr>
-        <p:txBody>
-          <a:bodyPr>
-            <a:noAutofit/>
-          </a:bodyPr>
-          <a:lstStyle/>
-          <a:p>
-            <a:pPr algn="ctr"/>
-            <a:r>
-              <a:rPr lang="en-US" sz="4400" dirty="0" smtClean="0"/>
-              <a:t>Team Organization</a:t>
-            </a:r>
-            <a:endParaRPr lang="en-US" sz="4400" dirty="0"/>
+        <p:spPr/>
+        <p:txBody>
+          <a:bodyPr/>
+          <a:lstStyle/>
+          <a:p>
+            <a:r>
+              <a:rPr lang="en-US" dirty="0" smtClean="0"/>
+              <a:t>Deployment Issues</a:t>
+            </a:r>
+            <a:endParaRPr lang="en-US" dirty="0"/>
           </a:p>
         </p:txBody>
       </p:sp>
@@ -6747,12 +6751,7 @@
             <p:ph idx="1"/>
           </p:nvPr>
         </p:nvSpPr>
-        <p:spPr>
-          <a:xfrm>
-            <a:off x="677334" y="1483360"/>
-            <a:ext cx="8596668" cy="5100320"/>
-          </a:xfrm>
-        </p:spPr>
+        <p:spPr/>
         <p:txBody>
           <a:bodyPr>
             <a:normAutofit/>
@@ -6761,82 +6760,64 @@
           <a:p>
             <a:r>
               <a:rPr lang="en-US" sz="2800" dirty="0" smtClean="0"/>
-              <a:t>Principles from Agile Processes</a:t>
-            </a:r>
-          </a:p>
-          <a:p>
-            <a:r>
-              <a:rPr lang="en-US" sz="2800" dirty="0" smtClean="0"/>
-              <a:t>Egoless Team Structure</a:t>
+              <a:t>Product must work on target environment</a:t>
             </a:r>
           </a:p>
           <a:p>
             <a:pPr lvl="1"/>
             <a:r>
               <a:rPr lang="en-US" sz="2600" dirty="0" smtClean="0"/>
-              <a:t>Democratic and decentralized</a:t>
+              <a:t>Recent Windows Operating Systems</a:t>
             </a:r>
           </a:p>
           <a:p>
             <a:pPr lvl="1"/>
             <a:r>
               <a:rPr lang="en-US" sz="2600" dirty="0" smtClean="0"/>
-              <a:t>Tasks needed to be done were taken on and chosen by the team member based on their skills and time availability</a:t>
+              <a:t>Handling problems with permissions and where files are placed on the user’s system</a:t>
+            </a:r>
+          </a:p>
+          <a:p>
+            <a:r>
+              <a:rPr lang="en-US" sz="2600" dirty="0" smtClean="0"/>
+              <a:t>All dependencies must be packaged with product</a:t>
             </a:r>
           </a:p>
           <a:p>
             <a:pPr lvl="1"/>
             <a:r>
+              <a:rPr lang="en-US" sz="2400" dirty="0" smtClean="0"/>
+              <a:t>DLLs, input files, other files, </a:t>
+            </a:r>
+            <a:r>
+              <a:rPr lang="en-US" sz="2400" dirty="0" err="1" smtClean="0"/>
+              <a:t>etc</a:t>
+            </a:r>
+            <a:endParaRPr lang="en-US" sz="2400" dirty="0" smtClean="0"/>
+          </a:p>
+          <a:p>
+            <a:r>
               <a:rPr lang="en-US" sz="2600" dirty="0" smtClean="0"/>
-              <a:t>Kept on track with </a:t>
-            </a:r>
-            <a:r>
-              <a:rPr lang="en-US" sz="2600" dirty="0"/>
-              <a:t>g</a:t>
-            </a:r>
-            <a:r>
-              <a:rPr lang="en-US" sz="2600" dirty="0" smtClean="0"/>
-              <a:t>roup chat over Slack</a:t>
-            </a:r>
-          </a:p>
-          <a:p>
-            <a:pPr lvl="2"/>
-            <a:r>
-              <a:rPr lang="en-US" sz="2400" dirty="0" smtClean="0"/>
-              <a:t>Documents shared over GitHub</a:t>
-            </a:r>
-          </a:p>
-          <a:p>
-            <a:pPr lvl="1"/>
-            <a:r>
-              <a:rPr lang="en-US" sz="2600" dirty="0" smtClean="0"/>
-              <a:t>Frequent Meetings in person / in class (if available) / Over the internet  (Google Hangout)</a:t>
-            </a:r>
-            <a:endParaRPr lang="en-US" sz="2800" dirty="0" smtClean="0"/>
-          </a:p>
-          <a:p>
-            <a:pPr lvl="1"/>
-            <a:endParaRPr lang="en-US" sz="2600" dirty="0"/>
+              <a:t>Make Installation as easy </a:t>
+            </a:r>
+            <a:r>
+              <a:rPr lang="en-US" sz="2600" smtClean="0"/>
+              <a:t>as possible</a:t>
+            </a:r>
+            <a:endParaRPr lang="en-US" sz="2600" dirty="0" smtClean="0"/>
           </a:p>
         </p:txBody>
       </p:sp>
     </p:spTree>
     <p:extLst>
       <p:ext uri="{BB962C8B-B14F-4D97-AF65-F5344CB8AC3E}">
-        <p14:creationId xmlns:p14="http://schemas.microsoft.com/office/powerpoint/2010/main" val="344247390"/>
+        <p14:creationId xmlns:p14="http://schemas.microsoft.com/office/powerpoint/2010/main" val="2790725912"/>
       </p:ext>
     </p:extLst>
   </p:cSld>
   <p:clrMapOvr>
     <a:masterClrMapping/>
   </p:clrMapOvr>
-  <p:timing>
-    <p:tnLst>
-      <p:par>
-        <p:cTn id="1" dur="indefinite" restart="never" nodeType="tmRoot"/>
-      </p:par>
-    </p:tnLst>
-  </p:timing>
 </p:sld>
 </file>
 
@@ -6870,19 +6851,19 @@
         <p:spPr>
           <a:xfrm>
             <a:off x="677334" y="609600"/>
-            <a:ext cx="8596668" cy="731520"/>
+            <a:ext cx="8596668" cy="711200"/>
           </a:xfrm>
         </p:spPr>
         <p:txBody>
           <a:bodyPr>
-            <a:normAutofit fontScale="90000"/>
+            <a:noAutofit/>
           </a:bodyPr>
           <a:lstStyle/>
           <a:p>
             <a:pPr algn="ctr"/>
             <a:r>
               <a:rPr lang="en-US" sz="4400" dirty="0" smtClean="0"/>
-              <a:t>Different Approach</a:t>
+              <a:t>Team Organization</a:t>
             </a:r>
             <a:endParaRPr lang="en-US" sz="4400" dirty="0"/>
           </a:p>
@@ -6900,8 +6881,8 @@
         </p:nvSpPr>
         <p:spPr>
           <a:xfrm>
-            <a:off x="677334" y="1503679"/>
-            <a:ext cx="8596668" cy="4537683"/>
+            <a:off x="677334" y="1483360"/>
+            <a:ext cx="8596668" cy="5100320"/>
           </a:xfrm>
         </p:spPr>
         <p:txBody>
@@ -6912,54 +6893,69 @@
           <a:p>
             <a:r>
               <a:rPr lang="en-US" sz="2800" dirty="0" smtClean="0"/>
-              <a:t>If more time permitted…</a:t>
+              <a:t>Principles from Agile Processes</a:t>
+            </a:r>
+          </a:p>
+          <a:p>
+            <a:r>
+              <a:rPr lang="en-US" sz="2800" dirty="0" smtClean="0"/>
+              <a:t>Egoless Team Structure</a:t>
             </a:r>
           </a:p>
           <a:p>
             <a:pPr lvl="1"/>
             <a:r>
               <a:rPr lang="en-US" sz="2600" dirty="0" smtClean="0"/>
-              <a:t>More testing on certain functions</a:t>
+              <a:t>Democratic and decentralized</a:t>
             </a:r>
           </a:p>
           <a:p>
             <a:pPr lvl="1"/>
             <a:r>
               <a:rPr lang="en-US" sz="2600" dirty="0" smtClean="0"/>
-              <a:t>Make tables more distinguished</a:t>
+              <a:t>Tasks needed to be done were taken on and chosen by the team member based on their skills and time availability</a:t>
             </a:r>
           </a:p>
           <a:p>
             <a:pPr lvl="1"/>
             <a:r>
               <a:rPr lang="en-US" sz="2600" dirty="0" smtClean="0"/>
-              <a:t>More language support and threading</a:t>
+              <a:t>Kept on track with </a:t>
+            </a:r>
+            <a:r>
+              <a:rPr lang="en-US" sz="2600" dirty="0"/>
+              <a:t>g</a:t>
+            </a:r>
+            <a:r>
+              <a:rPr lang="en-US" sz="2600" dirty="0" smtClean="0"/>
+              <a:t>roup chat over Slack</a:t>
+            </a:r>
+          </a:p>
+          <a:p>
+            <a:pPr lvl="2"/>
+            <a:r>
+              <a:rPr lang="en-US" sz="2400" dirty="0" smtClean="0"/>
+              <a:t>Documents shared over GitHub</a:t>
             </a:r>
           </a:p>
           <a:p>
             <a:pPr lvl="1"/>
             <a:r>
               <a:rPr lang="en-US" sz="2600" dirty="0" smtClean="0"/>
-              <a:t>Implemented the other 3 testing methods</a:t>
-            </a:r>
+              <a:t>Frequent Meetings in person / in class (if available) / Over the internet  (Google Hangout)</a:t>
+            </a:r>
+            <a:endParaRPr lang="en-US" sz="2800" dirty="0" smtClean="0"/>
           </a:p>
           <a:p>
             <a:pPr lvl="1"/>
-            <a:r>
-              <a:rPr lang="en-US" sz="2600" dirty="0" smtClean="0"/>
-              <a:t>Better version management / More planning</a:t>
-            </a:r>
-          </a:p>
-          <a:p>
-            <a:pPr lvl="1"/>
-            <a:endParaRPr lang="en-US" sz="2600" dirty="0" smtClean="0"/>
+            <a:endParaRPr lang="en-US" sz="2600" dirty="0"/>
           </a:p>
         </p:txBody>
       </p:sp>
     </p:spTree>
     <p:extLst>
       <p:ext uri="{BB962C8B-B14F-4D97-AF65-F5344CB8AC3E}">
-        <p14:creationId xmlns:p14="http://schemas.microsoft.com/office/powerpoint/2010/main" val="3431267459"/>
+        <p14:creationId xmlns:p14="http://schemas.microsoft.com/office/powerpoint/2010/main" val="344247390"/>
       </p:ext>
     </p:extLst>
   </p:cSld>
@@ -7018,7 +7014,7 @@
             <a:pPr algn="ctr"/>
             <a:r>
               <a:rPr lang="en-US" sz="4400" dirty="0" smtClean="0"/>
-              <a:t>Future Extensions</a:t>
+              <a:t>Different Approach</a:t>
             </a:r>
             <a:endParaRPr lang="en-US" sz="4400" dirty="0"/>
           </a:p>
@@ -7048,50 +7044,66 @@
           <a:p>
             <a:r>
               <a:rPr lang="en-US" sz="2800" dirty="0" smtClean="0"/>
-              <a:t>Extend to reading more languages / Certain language options grayed out for future implementation</a:t>
+              <a:t>If more time permitted…</a:t>
             </a:r>
           </a:p>
           <a:p>
             <a:pPr lvl="1"/>
             <a:r>
               <a:rPr lang="en-US" sz="2600" dirty="0" smtClean="0"/>
-              <a:t>Only C++ source code can be selected currently</a:t>
+              <a:t>More testing on certain functions</a:t>
             </a:r>
           </a:p>
           <a:p>
             <a:pPr lvl="1"/>
             <a:r>
               <a:rPr lang="en-US" sz="2600" dirty="0" smtClean="0"/>
-              <a:t>Future languages to be implemented include;</a:t>
-            </a:r>
-          </a:p>
-          <a:p>
-            <a:pPr lvl="2"/>
-            <a:r>
-              <a:rPr lang="en-US" sz="2400" dirty="0" smtClean="0"/>
-              <a:t>Java</a:t>
-            </a:r>
-          </a:p>
-          <a:p>
-            <a:pPr lvl="2"/>
-            <a:r>
-              <a:rPr lang="en-US" sz="2400" dirty="0" smtClean="0"/>
-              <a:t>C#</a:t>
-            </a:r>
-          </a:p>
-          <a:p>
-            <a:pPr lvl="2"/>
-            <a:r>
-              <a:rPr lang="en-US" sz="2400" dirty="0" smtClean="0"/>
-              <a:t>Python</a:t>
-            </a:r>
+              <a:t>Make tables more distinguished</a:t>
+            </a:r>
+          </a:p>
+          <a:p>
+            <a:pPr lvl="1"/>
+            <a:r>
+              <a:rPr lang="en-US" sz="2600" dirty="0" smtClean="0"/>
+              <a:t>More language support and threading</a:t>
+            </a:r>
+          </a:p>
+          <a:p>
+            <a:pPr lvl="1"/>
+            <a:r>
+              <a:rPr lang="en-US" sz="2600" dirty="0" smtClean="0"/>
+              <a:t>Implemented the other 3 testing methods</a:t>
+            </a:r>
+          </a:p>
+          <a:p>
+            <a:pPr lvl="1"/>
+            <a:r>
+              <a:rPr lang="en-US" sz="2600" dirty="0" smtClean="0"/>
+              <a:t>Better version management / </a:t>
+            </a:r>
+            <a:r>
+              <a:rPr lang="en-US" sz="2600" dirty="0" smtClean="0"/>
+              <a:t>better</a:t>
+            </a:r>
+            <a:r>
+              <a:rPr lang="en-US" sz="2600" dirty="0" smtClean="0"/>
+              <a:t> </a:t>
+            </a:r>
+            <a:r>
+              <a:rPr lang="en-US" sz="2600" dirty="0" smtClean="0"/>
+              <a:t>planning</a:t>
+            </a:r>
+          </a:p>
+          <a:p>
+            <a:pPr lvl="1"/>
+            <a:endParaRPr lang="en-US" sz="2600" dirty="0" smtClean="0"/>
           </a:p>
         </p:txBody>
       </p:sp>
     </p:spTree>
     <p:extLst>
       <p:ext uri="{BB962C8B-B14F-4D97-AF65-F5344CB8AC3E}">
-        <p14:creationId xmlns:p14="http://schemas.microsoft.com/office/powerpoint/2010/main" val="3142858100"/>
+        <p14:creationId xmlns:p14="http://schemas.microsoft.com/office/powerpoint/2010/main" val="3431267459"/>
       </p:ext>
     </p:extLst>
   </p:cSld>
@@ -7150,6 +7162,147 @@
             <a:pPr algn="ctr"/>
             <a:r>
               <a:rPr lang="en-US" sz="4400" dirty="0" smtClean="0"/>
+              <a:t>Future Extensions</a:t>
+            </a:r>
+            <a:endParaRPr lang="en-US" sz="4400" dirty="0"/>
+          </a:p>
+        </p:txBody>
+      </p:sp>
+      <p:sp>
+        <p:nvSpPr>
+          <p:cNvPr id="3" name="Content Placeholder 2"/>
+          <p:cNvSpPr>
+            <a:spLocks noGrp="1"/>
+          </p:cNvSpPr>
+          <p:nvPr>
+            <p:ph idx="1"/>
+          </p:nvPr>
+        </p:nvSpPr>
+        <p:spPr>
+          <a:xfrm>
+            <a:off x="677334" y="1503679"/>
+            <a:ext cx="8596668" cy="4537683"/>
+          </a:xfrm>
+        </p:spPr>
+        <p:txBody>
+          <a:bodyPr>
+            <a:normAutofit/>
+          </a:bodyPr>
+          <a:lstStyle/>
+          <a:p>
+            <a:r>
+              <a:rPr lang="en-US" sz="2800" dirty="0" smtClean="0"/>
+              <a:t>Extend to reading more languages / Certain language options grayed out for future implementation</a:t>
+            </a:r>
+          </a:p>
+          <a:p>
+            <a:pPr lvl="1"/>
+            <a:r>
+              <a:rPr lang="en-US" sz="2600" dirty="0" smtClean="0"/>
+              <a:t>Only C++ source code can be selected currently</a:t>
+            </a:r>
+          </a:p>
+          <a:p>
+            <a:pPr lvl="1"/>
+            <a:r>
+              <a:rPr lang="en-US" sz="2600" dirty="0" smtClean="0"/>
+              <a:t>Future languages to be implemented </a:t>
+            </a:r>
+            <a:r>
+              <a:rPr lang="en-US" sz="2600" dirty="0" smtClean="0"/>
+              <a:t>include </a:t>
+            </a:r>
+            <a:r>
+              <a:rPr lang="en-US" sz="2400" dirty="0" smtClean="0"/>
+              <a:t>Java</a:t>
+            </a:r>
+            <a:r>
+              <a:rPr lang="en-US" sz="2400" dirty="0" smtClean="0"/>
+              <a:t>, </a:t>
+            </a:r>
+            <a:r>
+              <a:rPr lang="en-US" sz="2400" dirty="0" smtClean="0"/>
+              <a:t>C# and Python</a:t>
+            </a:r>
+          </a:p>
+          <a:p>
+            <a:r>
+              <a:rPr lang="en-US" sz="2600" dirty="0" smtClean="0"/>
+              <a:t>Extended to do Path, Functional and Loop testing</a:t>
+            </a:r>
+          </a:p>
+          <a:p>
+            <a:pPr lvl="1"/>
+            <a:r>
+              <a:rPr lang="en-US" sz="2400" dirty="0" smtClean="0"/>
+              <a:t>The three implemented right now are Object-Oriented, Random and Boundary Testing</a:t>
+            </a:r>
+            <a:endParaRPr lang="en-US" sz="2400" dirty="0"/>
+          </a:p>
+        </p:txBody>
+      </p:sp>
+    </p:spTree>
+    <p:extLst>
+      <p:ext uri="{BB962C8B-B14F-4D97-AF65-F5344CB8AC3E}">
+        <p14:creationId xmlns:p14="http://schemas.microsoft.com/office/powerpoint/2010/main" val="3142858100"/>
+      </p:ext>
+    </p:extLst>
+  </p:cSld>
+  <p:clrMapOvr>
+    <a:masterClrMapping/>
+  </p:clrMapOvr>
+  <p:timing>
+    <p:tnLst>
+      <p:par>
+        <p:cTn id="1" dur="indefinite" restart="never" nodeType="tmRoot"/>
+      </p:par>
+    </p:tnLst>
+  </p:timing>
+</p:sld>
+</file>
+
+<file path=ppt/slides/slide18.xml><?xml version="1.0" encoding="utf-8"?>
+<p:sld xmlns:a="http://schemas.openxmlformats.org/drawingml/2006/main" xmlns:r="http://schemas.openxmlformats.org/officeDocument/2006/relationships" xmlns:p="http://schemas.openxmlformats.org/presentationml/2006/main">
+  <p:cSld>
+    <p:spTree>
+      <p:nvGrpSpPr>
+        <p:cNvPr id="1" name=""/>
+        <p:cNvGrpSpPr/>
+        <p:nvPr/>
+      </p:nvGrpSpPr>
+      <p:grpSpPr>
+        <a:xfrm>
+          <a:off x="0" y="0"/>
+          <a:ext cx="0" cy="0"/>
+          <a:chOff x="0" y="0"/>
+          <a:chExt cx="0" cy="0"/>
+        </a:xfrm>
+      </p:grpSpPr>
+      <p:sp>
+        <p:nvSpPr>
+          <p:cNvPr id="2" name="Title 1"/>
+          <p:cNvSpPr>
+            <a:spLocks noGrp="1"/>
+          </p:cNvSpPr>
+          <p:nvPr>
+            <p:ph type="title"/>
+          </p:nvPr>
+        </p:nvSpPr>
+        <p:spPr>
+          <a:xfrm>
+            <a:off x="677334" y="609600"/>
+            <a:ext cx="8596668" cy="731520"/>
+          </a:xfrm>
+        </p:spPr>
+        <p:txBody>
+          <a:bodyPr>
+            <a:normAutofit fontScale="90000"/>
+          </a:bodyPr>
+          <a:lstStyle/>
+          <a:p>
+            <a:pPr algn="ctr"/>
+            <a:r>
+              <a:rPr lang="en-US" sz="4400" dirty="0" smtClean="0"/>
               <a:t>Conclusion / What we Learned</a:t>
             </a:r>
             <a:endParaRPr lang="en-US" sz="4400" dirty="0"/>
@@ -7250,7 +7403,7 @@
 </p:sld>
 </file>
 
-<file path=ppt/slides/slide18.xml><?xml version="1.0" encoding="utf-8"?>
+<file path=ppt/slides/slide19.xml><?xml version="1.0" encoding="utf-8"?>
 <p:sld xmlns:a="http://schemas.openxmlformats.org/drawingml/2006/main" xmlns:r="http://schemas.openxmlformats.org/officeDocument/2006/relationships" xmlns:p="http://schemas.openxmlformats.org/presentationml/2006/main">
   <p:cSld>
     <p:spTree>

</xml_diff>